<commit_message>
Add additional infos for platforms
</commit_message>
<xml_diff>
--- a/pptx/UmfrageErgebnissePLUSPlatformenUNDDashboard.pptx
+++ b/pptx/UmfrageErgebnissePLUSPlatformenUNDDashboard.pptx
@@ -284,16 +284,63 @@
 </p:presentation>
 </file>
 
-<file path=ppt/revisionInfo.xml><?xml version="1.0" encoding="utf-8"?>
-<p1510:revInfo xmlns:a="http://schemas.openxmlformats.org/drawingml/2006/main" xmlns:r="http://schemas.openxmlformats.org/officeDocument/2006/relationships" xmlns:p1510="http://schemas.microsoft.com/office/powerpoint/2015/10/main">
-  <p1510:revLst>
-    <p1510:client id="{235AD3CA-1B59-45BC-B357-805F5A4BF4BC}" v="13" dt="2022-10-16T09:52:31.579"/>
-  </p1510:revLst>
-</p1510:revInfo>
-</file>
-
 <file path=ppt/changesInfos/changesInfo1.xml><?xml version="1.0" encoding="utf-8"?>
 <pc:chgInfo xmlns:a="http://schemas.openxmlformats.org/drawingml/2006/main" xmlns:r="http://schemas.openxmlformats.org/officeDocument/2006/relationships" xmlns:ac="http://schemas.microsoft.com/office/drawing/2013/main/command" xmlns:pc="http://schemas.microsoft.com/office/powerpoint/2013/main/command">
+  <pc:docChgLst>
+    <pc:chgData name="Simon RS" userId="8de322db93951f0c" providerId="LiveId" clId="{2BDF6C5B-60DD-47E5-8292-8AB879DEE815}"/>
+    <pc:docChg chg="undo custSel modSld">
+      <pc:chgData name="Simon RS" userId="8de322db93951f0c" providerId="LiveId" clId="{2BDF6C5B-60DD-47E5-8292-8AB879DEE815}" dt="2022-10-17T17:48:50.453" v="844" actId="113"/>
+      <pc:docMkLst>
+        <pc:docMk/>
+      </pc:docMkLst>
+      <pc:sldChg chg="modSp mod">
+        <pc:chgData name="Simon RS" userId="8de322db93951f0c" providerId="LiveId" clId="{2BDF6C5B-60DD-47E5-8292-8AB879DEE815}" dt="2022-10-17T17:45:48.322" v="460" actId="113"/>
+        <pc:sldMkLst>
+          <pc:docMk/>
+          <pc:sldMk cId="1588736127" sldId="317"/>
+        </pc:sldMkLst>
+        <pc:spChg chg="mod">
+          <ac:chgData name="Simon RS" userId="8de322db93951f0c" providerId="LiveId" clId="{2BDF6C5B-60DD-47E5-8292-8AB879DEE815}" dt="2022-10-17T17:36:03.097" v="9" actId="20577"/>
+          <ac:spMkLst>
+            <pc:docMk/>
+            <pc:sldMk cId="1588736127" sldId="317"/>
+            <ac:spMk id="2" creationId="{10CD2168-6997-0D9F-51A4-3C3012A49142}"/>
+          </ac:spMkLst>
+        </pc:spChg>
+        <pc:spChg chg="mod">
+          <ac:chgData name="Simon RS" userId="8de322db93951f0c" providerId="LiveId" clId="{2BDF6C5B-60DD-47E5-8292-8AB879DEE815}" dt="2022-10-17T17:45:48.322" v="460" actId="113"/>
+          <ac:spMkLst>
+            <pc:docMk/>
+            <pc:sldMk cId="1588736127" sldId="317"/>
+            <ac:spMk id="3" creationId="{D54E37F2-22AE-CAAF-F379-706B60C27C91}"/>
+          </ac:spMkLst>
+        </pc:spChg>
+      </pc:sldChg>
+      <pc:sldChg chg="modSp mod">
+        <pc:chgData name="Simon RS" userId="8de322db93951f0c" providerId="LiveId" clId="{2BDF6C5B-60DD-47E5-8292-8AB879DEE815}" dt="2022-10-17T17:48:50.453" v="844" actId="113"/>
+        <pc:sldMkLst>
+          <pc:docMk/>
+          <pc:sldMk cId="1409133261" sldId="318"/>
+        </pc:sldMkLst>
+        <pc:spChg chg="mod">
+          <ac:chgData name="Simon RS" userId="8de322db93951f0c" providerId="LiveId" clId="{2BDF6C5B-60DD-47E5-8292-8AB879DEE815}" dt="2022-10-17T17:46:06.763" v="483" actId="14100"/>
+          <ac:spMkLst>
+            <pc:docMk/>
+            <pc:sldMk cId="1409133261" sldId="318"/>
+            <ac:spMk id="2" creationId="{7A6478A6-DEF4-FC05-6CF2-ED0A992D7D15}"/>
+          </ac:spMkLst>
+        </pc:spChg>
+        <pc:spChg chg="mod">
+          <ac:chgData name="Simon RS" userId="8de322db93951f0c" providerId="LiveId" clId="{2BDF6C5B-60DD-47E5-8292-8AB879DEE815}" dt="2022-10-17T17:48:50.453" v="844" actId="113"/>
+          <ac:spMkLst>
+            <pc:docMk/>
+            <pc:sldMk cId="1409133261" sldId="318"/>
+            <ac:spMk id="3" creationId="{2672E439-C03E-BE36-B74C-340A98094E8B}"/>
+          </ac:spMkLst>
+        </pc:spChg>
+      </pc:sldChg>
+    </pc:docChg>
+  </pc:docChgLst>
   <pc:docChgLst>
     <pc:chgData name="Simon RS" userId="8de322db93951f0c" providerId="LiveId" clId="{235AD3CA-1B59-45BC-B357-805F5A4BF4BC}"/>
     <pc:docChg chg="undo custSel addSld modSld">
@@ -13398,25 +13445,70 @@
             <p:ph type="body" idx="1"/>
           </p:nvPr>
         </p:nvSpPr>
-        <p:spPr/>
+        <p:spPr>
+          <a:xfrm>
+            <a:off x="713400" y="1812450"/>
+            <a:ext cx="7809876" cy="2750100"/>
+          </a:xfrm>
+        </p:spPr>
         <p:txBody>
           <a:bodyPr/>
           <a:lstStyle/>
           <a:p>
             <a:r>
-              <a:rPr lang="de-AT" dirty="0"/>
+              <a:rPr lang="de-AT" b="1" dirty="0"/>
               <a:t>Shelly</a:t>
             </a:r>
           </a:p>
           <a:p>
+            <a:pPr lvl="1"/>
+            <a:r>
+              <a:rPr lang="de-AT" dirty="0"/>
+              <a:t>Open Source</a:t>
+            </a:r>
+          </a:p>
+          <a:p>
+            <a:pPr lvl="1"/>
+            <a:r>
+              <a:rPr lang="de-AT" dirty="0"/>
+              <a:t>Nachrüstbare Teile f. bestehende Infrastruktur (zB. Smarte-</a:t>
+            </a:r>
             <a:r>
               <a:rPr lang="de-AT" dirty="0" err="1"/>
+              <a:t>Relays</a:t>
+            </a:r>
+            <a:r>
+              <a:rPr lang="de-AT" dirty="0"/>
+              <a:t>)</a:t>
+            </a:r>
+          </a:p>
+          <a:p>
+            <a:r>
+              <a:rPr lang="de-AT" b="1" dirty="0" err="1"/>
               <a:t>Tinkerforge</a:t>
             </a:r>
-            <a:endParaRPr lang="de-AT" dirty="0"/>
+            <a:endParaRPr lang="de-AT" b="1" dirty="0"/>
           </a:p>
           <a:p>
-            <a:endParaRPr lang="de-AT" dirty="0"/>
+            <a:pPr lvl="1"/>
+            <a:r>
+              <a:rPr lang="de-AT" dirty="0"/>
+              <a:t>Open Source</a:t>
+            </a:r>
+          </a:p>
+          <a:p>
+            <a:pPr lvl="1"/>
+            <a:r>
+              <a:rPr lang="de-AT" dirty="0"/>
+              <a:t>34 Sensoren verfügbar</a:t>
+            </a:r>
+          </a:p>
+          <a:p>
+            <a:pPr lvl="1"/>
+            <a:r>
+              <a:rPr lang="de-AT" dirty="0"/>
+              <a:t>Eher modularer/atomarer („kleinere Teile“ =&gt; mehr selbst bauen)</a:t>
+            </a:r>
           </a:p>
         </p:txBody>
       </p:sp>
@@ -13468,8 +13560,8 @@
         </p:nvSpPr>
         <p:spPr>
           <a:xfrm>
-            <a:off x="713400" y="580950"/>
-            <a:ext cx="4719604" cy="1231500"/>
+            <a:off x="713399" y="580950"/>
+            <a:ext cx="6414915" cy="1231500"/>
           </a:xfrm>
         </p:spPr>
         <p:txBody>
@@ -13478,7 +13570,7 @@
           <a:p>
             <a:r>
               <a:rPr lang="de-AT" dirty="0"/>
-              <a:t>Dashboard Funktionalitäten</a:t>
+              <a:t>Dashboard Ansichten - Gliederung</a:t>
             </a:r>
           </a:p>
         </p:txBody>
@@ -13502,7 +13594,7 @@
         <p:spPr>
           <a:xfrm>
             <a:off x="713400" y="1812450"/>
-            <a:ext cx="4719604" cy="2750100"/>
+            <a:ext cx="5427096" cy="2750100"/>
           </a:xfrm>
         </p:spPr>
         <p:txBody>
@@ -13514,31 +13606,59 @@
             </a:pPr>
             <a:r>
               <a:rPr lang="de-AT" sz="1600" b="1" u="sng" dirty="0"/>
-              <a:t>Ansichten</a:t>
+              <a:t>Mögliche Ansichten:</a:t>
             </a:r>
           </a:p>
           <a:p>
             <a:r>
-              <a:rPr lang="de-AT" dirty="0"/>
+              <a:rPr lang="de-AT" b="1" dirty="0"/>
               <a:t>Sicherheit</a:t>
             </a:r>
           </a:p>
           <a:p>
+            <a:pPr lvl="1"/>
             <a:r>
               <a:rPr lang="de-AT" dirty="0"/>
+              <a:t>Zeigt zB. ob Türen abgeschlossen sind oder ob jemand ums Haus schleicht</a:t>
+            </a:r>
+          </a:p>
+          <a:p>
+            <a:r>
+              <a:rPr lang="de-AT" b="1" dirty="0"/>
               <a:t>Komfort</a:t>
             </a:r>
           </a:p>
           <a:p>
+            <a:pPr lvl="1"/>
             <a:r>
               <a:rPr lang="de-AT" dirty="0"/>
+              <a:t>zB. Temperaturen, Luftfeuchtigkeit, Lichter, etc.</a:t>
+            </a:r>
+          </a:p>
+          <a:p>
+            <a:r>
+              <a:rPr lang="de-AT" b="1" dirty="0"/>
               <a:t>Outdoor</a:t>
             </a:r>
           </a:p>
           <a:p>
+            <a:pPr lvl="1"/>
             <a:r>
               <a:rPr lang="de-AT" dirty="0"/>
+              <a:t>zB. Außentemperatur, andere Geräte im Außenbereich, etc.</a:t>
+            </a:r>
+          </a:p>
+          <a:p>
+            <a:r>
+              <a:rPr lang="de-AT" b="1" dirty="0"/>
               <a:t>Indoor</a:t>
+            </a:r>
+          </a:p>
+          <a:p>
+            <a:pPr lvl="1"/>
+            <a:r>
+              <a:rPr lang="de-AT" dirty="0"/>
+              <a:t>Sonstige Geräte im Innenbereich</a:t>
             </a:r>
           </a:p>
         </p:txBody>

</xml_diff>